<commit_message>
M1 C4 P2 e M2 C3 P1
</commit_message>
<xml_diff>
--- a/curso/modulo2capitulo3-off.pptx
+++ b/curso/modulo2capitulo3-off.pptx
@@ -13,6 +13,8 @@
     <p:sldId id="261" r:id="rId7"/>
     <p:sldId id="262" r:id="rId8"/>
     <p:sldId id="263" r:id="rId9"/>
+    <p:sldId id="264" r:id="rId10"/>
+    <p:sldId id="265" r:id="rId11"/>
   </p:sldIdLst>
   <p:sldSz cx="9144000" cy="6858000" type="screen4x3"/>
   <p:notesSz cx="6858000" cy="9144000"/>
@@ -499,7 +501,7 @@
             <a:fld id="{DC997751-B773-4FFE-B439-10C23787B14F}" type="datetimeFigureOut">
               <a:rPr lang="pt-BR" smtClean="0"/>
               <a:pPr/>
-              <a:t>27/8/2015</a:t>
+              <a:t>29/8/2015</a:t>
             </a:fld>
             <a:endParaRPr lang="pt-BR"/>
           </a:p>
@@ -666,7 +668,7 @@
             <a:fld id="{DC997751-B773-4FFE-B439-10C23787B14F}" type="datetimeFigureOut">
               <a:rPr lang="pt-BR" smtClean="0"/>
               <a:pPr/>
-              <a:t>27/8/2015</a:t>
+              <a:t>29/8/2015</a:t>
             </a:fld>
             <a:endParaRPr lang="pt-BR"/>
           </a:p>
@@ -843,7 +845,7 @@
             <a:fld id="{DC997751-B773-4FFE-B439-10C23787B14F}" type="datetimeFigureOut">
               <a:rPr lang="pt-BR" smtClean="0"/>
               <a:pPr/>
-              <a:t>27/8/2015</a:t>
+              <a:t>29/8/2015</a:t>
             </a:fld>
             <a:endParaRPr lang="pt-BR"/>
           </a:p>
@@ -1014,7 +1016,7 @@
             <a:fld id="{DC997751-B773-4FFE-B439-10C23787B14F}" type="datetimeFigureOut">
               <a:rPr lang="pt-BR" smtClean="0"/>
               <a:pPr/>
-              <a:t>27/8/2015</a:t>
+              <a:t>29/8/2015</a:t>
             </a:fld>
             <a:endParaRPr lang="pt-BR"/>
           </a:p>
@@ -1471,7 +1473,7 @@
             <a:fld id="{DC997751-B773-4FFE-B439-10C23787B14F}" type="datetimeFigureOut">
               <a:rPr lang="pt-BR" smtClean="0"/>
               <a:pPr/>
-              <a:t>27/8/2015</a:t>
+              <a:t>29/8/2015</a:t>
             </a:fld>
             <a:endParaRPr lang="pt-BR"/>
           </a:p>
@@ -1737,7 +1739,7 @@
             <a:fld id="{DC997751-B773-4FFE-B439-10C23787B14F}" type="datetimeFigureOut">
               <a:rPr lang="pt-BR" smtClean="0"/>
               <a:pPr/>
-              <a:t>27/8/2015</a:t>
+              <a:t>29/8/2015</a:t>
             </a:fld>
             <a:endParaRPr lang="pt-BR"/>
           </a:p>
@@ -2113,7 +2115,7 @@
             <a:fld id="{DC997751-B773-4FFE-B439-10C23787B14F}" type="datetimeFigureOut">
               <a:rPr lang="pt-BR" smtClean="0"/>
               <a:pPr/>
-              <a:t>27/8/2015</a:t>
+              <a:t>29/8/2015</a:t>
             </a:fld>
             <a:endParaRPr lang="pt-BR"/>
           </a:p>
@@ -2237,7 +2239,7 @@
             <a:fld id="{DC997751-B773-4FFE-B439-10C23787B14F}" type="datetimeFigureOut">
               <a:rPr lang="pt-BR" smtClean="0"/>
               <a:pPr/>
-              <a:t>27/8/2015</a:t>
+              <a:t>29/8/2015</a:t>
             </a:fld>
             <a:endParaRPr lang="pt-BR"/>
           </a:p>
@@ -2329,7 +2331,7 @@
             <a:fld id="{DC997751-B773-4FFE-B439-10C23787B14F}" type="datetimeFigureOut">
               <a:rPr lang="pt-BR" smtClean="0"/>
               <a:pPr/>
-              <a:t>27/8/2015</a:t>
+              <a:t>29/8/2015</a:t>
             </a:fld>
             <a:endParaRPr lang="pt-BR"/>
           </a:p>
@@ -2580,7 +2582,7 @@
             <a:fld id="{DC997751-B773-4FFE-B439-10C23787B14F}" type="datetimeFigureOut">
               <a:rPr lang="pt-BR" smtClean="0"/>
               <a:pPr/>
-              <a:t>27/8/2015</a:t>
+              <a:t>29/8/2015</a:t>
             </a:fld>
             <a:endParaRPr lang="pt-BR"/>
           </a:p>
@@ -2841,7 +2843,7 @@
             <a:fld id="{DC997751-B773-4FFE-B439-10C23787B14F}" type="datetimeFigureOut">
               <a:rPr lang="pt-BR" smtClean="0"/>
               <a:pPr/>
-              <a:t>27/8/2015</a:t>
+              <a:t>29/8/2015</a:t>
             </a:fld>
             <a:endParaRPr lang="pt-BR"/>
           </a:p>
@@ -3247,7 +3249,7 @@
             <a:fld id="{DC997751-B773-4FFE-B439-10C23787B14F}" type="datetimeFigureOut">
               <a:rPr lang="pt-BR" smtClean="0"/>
               <a:pPr/>
-              <a:t>27/8/2015</a:t>
+              <a:t>29/8/2015</a:t>
             </a:fld>
             <a:endParaRPr lang="pt-BR"/>
           </a:p>
@@ -3677,15 +3679,7 @@
             </a:br>
             <a:r>
               <a:rPr lang="pt-BR" dirty="0" smtClean="0"/>
-              <a:t>Capítulo </a:t>
-            </a:r>
-            <a:r>
-              <a:rPr lang="pt-BR" dirty="0" smtClean="0"/>
-              <a:t>3:</a:t>
-            </a:r>
-            <a:r>
-              <a:rPr lang="pt-BR" dirty="0" smtClean="0"/>
-              <a:t/>
+              <a:t>Capítulo 3:</a:t>
             </a:r>
             <a:br>
               <a:rPr lang="pt-BR" dirty="0" smtClean="0"/>
@@ -3749,6 +3743,184 @@
       </p:par>
     </p:tnLst>
   </p:timing>
+</p:sld>
+</file>
+
+<file path=ppt/slides/slide10.xml><?xml version="1.0" encoding="utf-8"?>
+<p:sld xmlns:a="http://schemas.openxmlformats.org/drawingml/2006/main" xmlns:r="http://schemas.openxmlformats.org/officeDocument/2006/relationships" xmlns:p="http://schemas.openxmlformats.org/presentationml/2006/main">
+  <p:cSld>
+    <p:spTree>
+      <p:nvGrpSpPr>
+        <p:cNvPr id="1" name=""/>
+        <p:cNvGrpSpPr/>
+        <p:nvPr/>
+      </p:nvGrpSpPr>
+      <p:grpSpPr>
+        <a:xfrm>
+          <a:off x="0" y="0"/>
+          <a:ext cx="0" cy="0"/>
+          <a:chOff x="0" y="0"/>
+          <a:chExt cx="0" cy="0"/>
+        </a:xfrm>
+      </p:grpSpPr>
+      <p:sp>
+        <p:nvSpPr>
+          <p:cNvPr id="2" name="Título 1"/>
+          <p:cNvSpPr>
+            <a:spLocks noGrp="1"/>
+          </p:cNvSpPr>
+          <p:nvPr>
+            <p:ph type="title"/>
+          </p:nvPr>
+        </p:nvSpPr>
+        <p:spPr/>
+        <p:txBody>
+          <a:bodyPr/>
+          <a:lstStyle/>
+          <a:p>
+            <a:r>
+              <a:rPr lang="pt-BR" dirty="0" smtClean="0"/>
+              <a:t>Arquivos de Texto</a:t>
+            </a:r>
+            <a:endParaRPr lang="pt-BR" dirty="0"/>
+          </a:p>
+        </p:txBody>
+      </p:sp>
+      <p:sp>
+        <p:nvSpPr>
+          <p:cNvPr id="3" name="Espaço Reservado para Conteúdo 2"/>
+          <p:cNvSpPr>
+            <a:spLocks noGrp="1"/>
+          </p:cNvSpPr>
+          <p:nvPr>
+            <p:ph idx="1"/>
+          </p:nvPr>
+        </p:nvSpPr>
+        <p:spPr/>
+        <p:txBody>
+          <a:bodyPr/>
+          <a:lstStyle/>
+          <a:p>
+            <a:r>
+              <a:rPr lang="pt-BR" dirty="0" smtClean="0"/>
+              <a:t>Para escrita de arquivos texto, usa-se a classe </a:t>
+            </a:r>
+            <a:r>
+              <a:rPr lang="pt-BR" dirty="0" smtClean="0">
+                <a:solidFill>
+                  <a:srgbClr val="92D050"/>
+                </a:solidFill>
+              </a:rPr>
+              <a:t>System.IO.</a:t>
+            </a:r>
+            <a:r>
+              <a:rPr lang="pt-BR" dirty="0" err="1" smtClean="0">
+                <a:solidFill>
+                  <a:srgbClr val="92D050"/>
+                </a:solidFill>
+              </a:rPr>
+              <a:t>StreamWriter</a:t>
+            </a:r>
+            <a:endParaRPr lang="pt-BR" dirty="0" smtClean="0">
+              <a:solidFill>
+                <a:srgbClr val="92D050"/>
+              </a:solidFill>
+            </a:endParaRPr>
+          </a:p>
+          <a:p>
+            <a:r>
+              <a:rPr lang="pt-BR" dirty="0" smtClean="0"/>
+              <a:t>Essa classe é usada para criar arquivos e também adicionar texto a arquivos existentes</a:t>
+            </a:r>
+          </a:p>
+          <a:p>
+            <a:r>
+              <a:rPr lang="pt-BR" dirty="0" smtClean="0"/>
+              <a:t>Essa classe oferece os seguintes métodos de escrita:</a:t>
+            </a:r>
+          </a:p>
+          <a:p>
+            <a:pPr lvl="1"/>
+            <a:r>
+              <a:rPr lang="pt-BR" dirty="0" err="1" smtClean="0">
+                <a:solidFill>
+                  <a:srgbClr val="92D050"/>
+                </a:solidFill>
+              </a:rPr>
+              <a:t>void</a:t>
+            </a:r>
+            <a:r>
+              <a:rPr lang="pt-BR" dirty="0" smtClean="0">
+                <a:solidFill>
+                  <a:srgbClr val="92D050"/>
+                </a:solidFill>
+              </a:rPr>
+              <a:t> </a:t>
+            </a:r>
+            <a:r>
+              <a:rPr lang="pt-BR" dirty="0" err="1" smtClean="0">
+                <a:solidFill>
+                  <a:srgbClr val="92D050"/>
+                </a:solidFill>
+              </a:rPr>
+              <a:t>Write</a:t>
+            </a:r>
+            <a:r>
+              <a:rPr lang="pt-BR" dirty="0" smtClean="0">
+                <a:solidFill>
+                  <a:srgbClr val="92D050"/>
+                </a:solidFill>
+              </a:rPr>
+              <a:t>()</a:t>
+            </a:r>
+          </a:p>
+          <a:p>
+            <a:pPr lvl="1"/>
+            <a:r>
+              <a:rPr lang="pt-BR" dirty="0" err="1" smtClean="0">
+                <a:solidFill>
+                  <a:srgbClr val="92D050"/>
+                </a:solidFill>
+              </a:rPr>
+              <a:t>void</a:t>
+            </a:r>
+            <a:r>
+              <a:rPr lang="pt-BR" dirty="0" smtClean="0">
+                <a:solidFill>
+                  <a:srgbClr val="92D050"/>
+                </a:solidFill>
+              </a:rPr>
+              <a:t> </a:t>
+            </a:r>
+            <a:r>
+              <a:rPr lang="pt-BR" dirty="0" err="1" smtClean="0">
+                <a:solidFill>
+                  <a:srgbClr val="92D050"/>
+                </a:solidFill>
+              </a:rPr>
+              <a:t>WriteLine</a:t>
+            </a:r>
+            <a:r>
+              <a:rPr lang="pt-BR" dirty="0" smtClean="0">
+                <a:solidFill>
+                  <a:srgbClr val="92D050"/>
+                </a:solidFill>
+              </a:rPr>
+              <a:t>()</a:t>
+            </a:r>
+            <a:endParaRPr lang="pt-BR" dirty="0">
+              <a:solidFill>
+                <a:srgbClr val="92D050"/>
+              </a:solidFill>
+            </a:endParaRPr>
+          </a:p>
+        </p:txBody>
+      </p:sp>
+    </p:spTree>
+  </p:cSld>
+  <p:clrMapOvr>
+    <a:masterClrMapping/>
+  </p:clrMapOvr>
 </p:sld>
 </file>
 
@@ -3835,27 +4007,14 @@
           <a:p>
             <a:r>
               <a:rPr lang="pt-BR" dirty="0" smtClean="0"/>
-              <a:t>Explorador </a:t>
-            </a:r>
-            <a:r>
-              <a:rPr lang="pt-BR" dirty="0" smtClean="0"/>
-              <a:t>de </a:t>
-            </a:r>
-            <a:r>
-              <a:rPr lang="pt-BR" dirty="0" smtClean="0"/>
-              <a:t>Arquivos</a:t>
-            </a:r>
-          </a:p>
-          <a:p>
-            <a:r>
-              <a:rPr lang="pt-BR" dirty="0" smtClean="0"/>
-              <a:t>Arquivos de </a:t>
-            </a:r>
-            <a:r>
-              <a:rPr lang="pt-BR" dirty="0" smtClean="0"/>
-              <a:t>Configuração</a:t>
-            </a:r>
-            <a:endParaRPr lang="pt-BR" dirty="0" smtClean="0"/>
+              <a:t>Explorador de Arquivos</a:t>
+            </a:r>
+          </a:p>
+          <a:p>
+            <a:r>
+              <a:rPr lang="pt-BR" dirty="0" smtClean="0"/>
+              <a:t>Arquivos de Configuração</a:t>
+            </a:r>
           </a:p>
         </p:txBody>
       </p:sp>
@@ -4116,15 +4275,7 @@
                   <a:srgbClr val="92D050"/>
                 </a:solidFill>
               </a:rPr>
-              <a:t>t</a:t>
-            </a:r>
-            <a:r>
-              <a:rPr lang="pt-BR" dirty="0" err="1" smtClean="0">
-                <a:solidFill>
-                  <a:srgbClr val="92D050"/>
-                </a:solidFill>
-              </a:rPr>
-              <a:t>ry</a:t>
+              <a:t>try</a:t>
             </a:r>
             <a:endParaRPr lang="pt-BR" dirty="0" smtClean="0">
               <a:solidFill>
@@ -4266,11 +4417,7 @@
             </a:pPr>
             <a:r>
               <a:rPr lang="pt-BR" dirty="0" smtClean="0"/>
-              <a:t>Todas as exceções derivam </a:t>
-            </a:r>
-            <a:r>
-              <a:rPr lang="pt-BR" dirty="0" smtClean="0"/>
-              <a:t>da classe </a:t>
+              <a:t>Todas as exceções derivam da classe </a:t>
             </a:r>
             <a:r>
               <a:rPr lang="pt-BR" dirty="0" smtClean="0">
@@ -4516,7 +4663,6 @@
               <a:rPr lang="pt-BR" dirty="0" smtClean="0"/>
               <a:t>A informação se perde quando o programa encerra</a:t>
             </a:r>
-            <a:endParaRPr lang="pt-BR" dirty="0" smtClean="0"/>
           </a:p>
           <a:p>
             <a:r>
@@ -4834,6 +4980,246 @@
             <a:r>
               <a:rPr lang="pt-BR" dirty="0" smtClean="0"/>
               <a:t>Permissões</a:t>
+            </a:r>
+            <a:endParaRPr lang="pt-BR" dirty="0"/>
+          </a:p>
+        </p:txBody>
+      </p:sp>
+    </p:spTree>
+  </p:cSld>
+  <p:clrMapOvr>
+    <a:masterClrMapping/>
+  </p:clrMapOvr>
+</p:sld>
+</file>
+
+<file path=ppt/slides/slide9.xml><?xml version="1.0" encoding="utf-8"?>
+<p:sld xmlns:a="http://schemas.openxmlformats.org/drawingml/2006/main" xmlns:r="http://schemas.openxmlformats.org/officeDocument/2006/relationships" xmlns:p="http://schemas.openxmlformats.org/presentationml/2006/main">
+  <p:cSld>
+    <p:spTree>
+      <p:nvGrpSpPr>
+        <p:cNvPr id="1" name=""/>
+        <p:cNvGrpSpPr/>
+        <p:nvPr/>
+      </p:nvGrpSpPr>
+      <p:grpSpPr>
+        <a:xfrm>
+          <a:off x="0" y="0"/>
+          <a:ext cx="0" cy="0"/>
+          <a:chOff x="0" y="0"/>
+          <a:chExt cx="0" cy="0"/>
+        </a:xfrm>
+      </p:grpSpPr>
+      <p:sp>
+        <p:nvSpPr>
+          <p:cNvPr id="2" name="Título 1"/>
+          <p:cNvSpPr>
+            <a:spLocks noGrp="1"/>
+          </p:cNvSpPr>
+          <p:nvPr>
+            <p:ph type="title"/>
+          </p:nvPr>
+        </p:nvSpPr>
+        <p:spPr/>
+        <p:txBody>
+          <a:bodyPr/>
+          <a:lstStyle/>
+          <a:p>
+            <a:r>
+              <a:rPr lang="pt-BR" dirty="0" smtClean="0"/>
+              <a:t>Arquivos de Texto</a:t>
+            </a:r>
+            <a:endParaRPr lang="pt-BR" dirty="0"/>
+          </a:p>
+        </p:txBody>
+      </p:sp>
+      <p:sp>
+        <p:nvSpPr>
+          <p:cNvPr id="3" name="Espaço Reservado para Conteúdo 2"/>
+          <p:cNvSpPr>
+            <a:spLocks noGrp="1"/>
+          </p:cNvSpPr>
+          <p:nvPr>
+            <p:ph idx="1"/>
+          </p:nvPr>
+        </p:nvSpPr>
+        <p:spPr/>
+        <p:txBody>
+          <a:bodyPr>
+            <a:normAutofit fontScale="92500" lnSpcReduction="10000"/>
+          </a:bodyPr>
+          <a:lstStyle/>
+          <a:p>
+            <a:r>
+              <a:rPr lang="pt-BR" dirty="0" smtClean="0"/>
+              <a:t>Para leitura de arquivos texto, usa-se a classe </a:t>
+            </a:r>
+            <a:r>
+              <a:rPr lang="pt-BR" dirty="0" smtClean="0">
+                <a:solidFill>
+                  <a:srgbClr val="92D050"/>
+                </a:solidFill>
+              </a:rPr>
+              <a:t>System.IO.</a:t>
+            </a:r>
+            <a:r>
+              <a:rPr lang="pt-BR" dirty="0" err="1" smtClean="0">
+                <a:solidFill>
+                  <a:srgbClr val="92D050"/>
+                </a:solidFill>
+              </a:rPr>
+              <a:t>StreamReader</a:t>
+            </a:r>
+            <a:endParaRPr lang="pt-BR" dirty="0" smtClean="0">
+              <a:solidFill>
+                <a:srgbClr val="92D050"/>
+              </a:solidFill>
+            </a:endParaRPr>
+          </a:p>
+          <a:p>
+            <a:r>
+              <a:rPr lang="pt-BR" dirty="0" smtClean="0"/>
+              <a:t>Essa classe oferece os seguintes métodos de leitura:</a:t>
+            </a:r>
+          </a:p>
+          <a:p>
+            <a:pPr lvl="1"/>
+            <a:r>
+              <a:rPr lang="pt-BR" dirty="0" err="1" smtClean="0">
+                <a:solidFill>
+                  <a:srgbClr val="92D050"/>
+                </a:solidFill>
+              </a:rPr>
+              <a:t>int</a:t>
+            </a:r>
+            <a:r>
+              <a:rPr lang="pt-BR" dirty="0" smtClean="0">
+                <a:solidFill>
+                  <a:srgbClr val="92D050"/>
+                </a:solidFill>
+              </a:rPr>
+              <a:t> </a:t>
+            </a:r>
+            <a:r>
+              <a:rPr lang="pt-BR" dirty="0" err="1" smtClean="0">
+                <a:solidFill>
+                  <a:srgbClr val="92D050"/>
+                </a:solidFill>
+              </a:rPr>
+              <a:t>Read</a:t>
+            </a:r>
+            <a:r>
+              <a:rPr lang="pt-BR" dirty="0" smtClean="0">
+                <a:solidFill>
+                  <a:srgbClr val="92D050"/>
+                </a:solidFill>
+              </a:rPr>
+              <a:t>()</a:t>
+            </a:r>
+            <a:r>
+              <a:rPr lang="pt-BR" dirty="0" smtClean="0"/>
+              <a:t>: Lê o próximo caractere e avança a posição atual no arquivo;</a:t>
+            </a:r>
+          </a:p>
+          <a:p>
+            <a:pPr lvl="1"/>
+            <a:r>
+              <a:rPr lang="pt-BR" dirty="0" err="1" smtClean="0">
+                <a:solidFill>
+                  <a:srgbClr val="92D050"/>
+                </a:solidFill>
+              </a:rPr>
+              <a:t>int</a:t>
+            </a:r>
+            <a:r>
+              <a:rPr lang="pt-BR" dirty="0" smtClean="0">
+                <a:solidFill>
+                  <a:srgbClr val="92D050"/>
+                </a:solidFill>
+              </a:rPr>
+              <a:t> </a:t>
+            </a:r>
+            <a:r>
+              <a:rPr lang="pt-BR" dirty="0" err="1" smtClean="0">
+                <a:solidFill>
+                  <a:srgbClr val="92D050"/>
+                </a:solidFill>
+              </a:rPr>
+              <a:t>Peek</a:t>
+            </a:r>
+            <a:r>
+              <a:rPr lang="pt-BR" dirty="0" smtClean="0">
+                <a:solidFill>
+                  <a:srgbClr val="92D050"/>
+                </a:solidFill>
+              </a:rPr>
+              <a:t>()</a:t>
+            </a:r>
+            <a:r>
+              <a:rPr lang="pt-BR" dirty="0" smtClean="0"/>
+              <a:t>: Lê o próximo caractere sem avançar a posição atual no arquivo</a:t>
+            </a:r>
+          </a:p>
+          <a:p>
+            <a:pPr lvl="1"/>
+            <a:r>
+              <a:rPr lang="pt-BR" dirty="0" smtClean="0">
+                <a:solidFill>
+                  <a:srgbClr val="92D050"/>
+                </a:solidFill>
+              </a:rPr>
+              <a:t>string </a:t>
+            </a:r>
+            <a:r>
+              <a:rPr lang="pt-BR" dirty="0" err="1" smtClean="0">
+                <a:solidFill>
+                  <a:srgbClr val="92D050"/>
+                </a:solidFill>
+              </a:rPr>
+              <a:t>ReadLine</a:t>
+            </a:r>
+            <a:r>
+              <a:rPr lang="pt-BR" dirty="0" smtClean="0">
+                <a:solidFill>
+                  <a:srgbClr val="92D050"/>
+                </a:solidFill>
+              </a:rPr>
+              <a:t>()</a:t>
+            </a:r>
+            <a:r>
+              <a:rPr lang="pt-BR" dirty="0" smtClean="0"/>
+              <a:t>: Lê a próxima linha;</a:t>
+            </a:r>
+          </a:p>
+          <a:p>
+            <a:pPr lvl="1"/>
+            <a:r>
+              <a:rPr lang="pt-BR" dirty="0" smtClean="0">
+                <a:solidFill>
+                  <a:srgbClr val="92D050"/>
+                </a:solidFill>
+              </a:rPr>
+              <a:t>string </a:t>
+            </a:r>
+            <a:r>
+              <a:rPr lang="pt-BR" dirty="0" err="1" smtClean="0">
+                <a:solidFill>
+                  <a:srgbClr val="92D050"/>
+                </a:solidFill>
+              </a:rPr>
+              <a:t>ReadToEnd</a:t>
+            </a:r>
+            <a:r>
+              <a:rPr lang="pt-BR" dirty="0" smtClean="0">
+                <a:solidFill>
+                  <a:srgbClr val="92D050"/>
+                </a:solidFill>
+              </a:rPr>
+              <a:t>()</a:t>
+            </a:r>
+            <a:r>
+              <a:rPr lang="pt-BR" dirty="0" smtClean="0"/>
+              <a:t>: Lê o conteúdo todo do arquivo</a:t>
             </a:r>
             <a:endParaRPr lang="pt-BR" dirty="0"/>
           </a:p>

</xml_diff>

<commit_message>
M1 C4 P3 e M2 C3 P2
</commit_message>
<xml_diff>
--- a/curso/modulo2capitulo3-off.pptx
+++ b/curso/modulo2capitulo3-off.pptx
@@ -505,7 +505,7 @@
             <a:fld id="{DC997751-B773-4FFE-B439-10C23787B14F}" type="datetimeFigureOut">
               <a:rPr lang="pt-BR" smtClean="0"/>
               <a:pPr/>
-              <a:t>4/9/2015</a:t>
+              <a:t>5/9/2015</a:t>
             </a:fld>
             <a:endParaRPr lang="pt-BR"/>
           </a:p>
@@ -672,7 +672,7 @@
             <a:fld id="{DC997751-B773-4FFE-B439-10C23787B14F}" type="datetimeFigureOut">
               <a:rPr lang="pt-BR" smtClean="0"/>
               <a:pPr/>
-              <a:t>4/9/2015</a:t>
+              <a:t>5/9/2015</a:t>
             </a:fld>
             <a:endParaRPr lang="pt-BR"/>
           </a:p>
@@ -849,7 +849,7 @@
             <a:fld id="{DC997751-B773-4FFE-B439-10C23787B14F}" type="datetimeFigureOut">
               <a:rPr lang="pt-BR" smtClean="0"/>
               <a:pPr/>
-              <a:t>4/9/2015</a:t>
+              <a:t>5/9/2015</a:t>
             </a:fld>
             <a:endParaRPr lang="pt-BR"/>
           </a:p>
@@ -1020,7 +1020,7 @@
             <a:fld id="{DC997751-B773-4FFE-B439-10C23787B14F}" type="datetimeFigureOut">
               <a:rPr lang="pt-BR" smtClean="0"/>
               <a:pPr/>
-              <a:t>4/9/2015</a:t>
+              <a:t>5/9/2015</a:t>
             </a:fld>
             <a:endParaRPr lang="pt-BR"/>
           </a:p>
@@ -1477,7 +1477,7 @@
             <a:fld id="{DC997751-B773-4FFE-B439-10C23787B14F}" type="datetimeFigureOut">
               <a:rPr lang="pt-BR" smtClean="0"/>
               <a:pPr/>
-              <a:t>4/9/2015</a:t>
+              <a:t>5/9/2015</a:t>
             </a:fld>
             <a:endParaRPr lang="pt-BR"/>
           </a:p>
@@ -1743,7 +1743,7 @@
             <a:fld id="{DC997751-B773-4FFE-B439-10C23787B14F}" type="datetimeFigureOut">
               <a:rPr lang="pt-BR" smtClean="0"/>
               <a:pPr/>
-              <a:t>4/9/2015</a:t>
+              <a:t>5/9/2015</a:t>
             </a:fld>
             <a:endParaRPr lang="pt-BR"/>
           </a:p>
@@ -2119,7 +2119,7 @@
             <a:fld id="{DC997751-B773-4FFE-B439-10C23787B14F}" type="datetimeFigureOut">
               <a:rPr lang="pt-BR" smtClean="0"/>
               <a:pPr/>
-              <a:t>4/9/2015</a:t>
+              <a:t>5/9/2015</a:t>
             </a:fld>
             <a:endParaRPr lang="pt-BR"/>
           </a:p>
@@ -2243,7 +2243,7 @@
             <a:fld id="{DC997751-B773-4FFE-B439-10C23787B14F}" type="datetimeFigureOut">
               <a:rPr lang="pt-BR" smtClean="0"/>
               <a:pPr/>
-              <a:t>4/9/2015</a:t>
+              <a:t>5/9/2015</a:t>
             </a:fld>
             <a:endParaRPr lang="pt-BR"/>
           </a:p>
@@ -2335,7 +2335,7 @@
             <a:fld id="{DC997751-B773-4FFE-B439-10C23787B14F}" type="datetimeFigureOut">
               <a:rPr lang="pt-BR" smtClean="0"/>
               <a:pPr/>
-              <a:t>4/9/2015</a:t>
+              <a:t>5/9/2015</a:t>
             </a:fld>
             <a:endParaRPr lang="pt-BR"/>
           </a:p>
@@ -2586,7 +2586,7 @@
             <a:fld id="{DC997751-B773-4FFE-B439-10C23787B14F}" type="datetimeFigureOut">
               <a:rPr lang="pt-BR" smtClean="0"/>
               <a:pPr/>
-              <a:t>4/9/2015</a:t>
+              <a:t>5/9/2015</a:t>
             </a:fld>
             <a:endParaRPr lang="pt-BR"/>
           </a:p>
@@ -2847,7 +2847,7 @@
             <a:fld id="{DC997751-B773-4FFE-B439-10C23787B14F}" type="datetimeFigureOut">
               <a:rPr lang="pt-BR" smtClean="0"/>
               <a:pPr/>
-              <a:t>4/9/2015</a:t>
+              <a:t>5/9/2015</a:t>
             </a:fld>
             <a:endParaRPr lang="pt-BR"/>
           </a:p>
@@ -3253,7 +3253,7 @@
             <a:fld id="{DC997751-B773-4FFE-B439-10C23787B14F}" type="datetimeFigureOut">
               <a:rPr lang="pt-BR" smtClean="0"/>
               <a:pPr/>
-              <a:t>4/9/2015</a:t>
+              <a:t>5/9/2015</a:t>
             </a:fld>
             <a:endParaRPr lang="pt-BR"/>
           </a:p>
@@ -4298,11 +4298,7 @@
             </a:r>
             <a:r>
               <a:rPr lang="pt-BR" dirty="0" smtClean="0"/>
-              <a:t> de todos os alfabetos de todos os idiomas e dialetos do mundo </a:t>
-            </a:r>
-            <a:r>
-              <a:rPr lang="pt-BR" dirty="0" smtClean="0"/>
-              <a:t>inteiro</a:t>
+              <a:t> de todos os alfabetos de todos os idiomas e dialetos do mundo inteiro</a:t>
             </a:r>
           </a:p>
           <a:p>
@@ -4310,7 +4306,6 @@
               <a:rPr lang="pt-BR" dirty="0" smtClean="0"/>
               <a:t>Já tem mais de 107 mil caracteres</a:t>
             </a:r>
-            <a:endParaRPr lang="pt-BR" dirty="0" smtClean="0"/>
           </a:p>
           <a:p>
             <a:r>
@@ -4570,8 +4565,19 @@
           <a:p>
             <a:r>
               <a:rPr lang="pt-BR" dirty="0" smtClean="0"/>
-              <a:t>Codificações de Caracteres</a:t>
-            </a:r>
+              <a:t>Codificações de </a:t>
+            </a:r>
+            <a:r>
+              <a:rPr lang="pt-BR" dirty="0" smtClean="0"/>
+              <a:t>Caracteres</a:t>
+            </a:r>
+          </a:p>
+          <a:p>
+            <a:r>
+              <a:rPr lang="pt-BR" dirty="0" smtClean="0"/>
+              <a:t>Facilitadores para Arquivos de Texto</a:t>
+            </a:r>
+            <a:endParaRPr lang="pt-BR" dirty="0" smtClean="0"/>
           </a:p>
           <a:p>
             <a:r>
@@ -5519,8 +5525,9 @@
             <a:pPr lvl="1"/>
             <a:r>
               <a:rPr lang="pt-BR" dirty="0" smtClean="0"/>
-              <a:t>Caminho</a:t>
-            </a:r>
+              <a:t>Caminho (relativo ou absoluto)</a:t>
+            </a:r>
+            <a:endParaRPr lang="pt-BR" dirty="0" smtClean="0"/>
           </a:p>
           <a:p>
             <a:pPr lvl="1"/>

</xml_diff>